<commit_message>
small final changes made to these documents
</commit_message>
<xml_diff>
--- a/BME790_Sp2017/Week3Summary.pptx
+++ b/BME790_Sp2017/Week3Summary.pptx
@@ -212,7 +212,7 @@
           <a:p>
             <a:fld id="{D93625D4-FB5C-B040-BF47-5145EF22A59C}" type="datetimeFigureOut">
               <a:rPr lang="en-US" smtClean="0"/>
-              <a:t>2/1/2017</a:t>
+              <a:t>2/3/2017</a:t>
             </a:fld>
             <a:endParaRPr lang="en-US"/>
           </a:p>
@@ -2113,8 +2113,8 @@
         </p:nvSpPr>
         <p:spPr>
           <a:xfrm>
-            <a:off x="82549" y="2258780"/>
-            <a:ext cx="3810001" cy="2031325"/>
+            <a:off x="82770" y="2392894"/>
+            <a:ext cx="3810001" cy="1754326"/>
           </a:xfrm>
           <a:prstGeom prst="rect">
             <a:avLst/>
@@ -2142,7 +2142,7 @@
                   <a:srgbClr val="000000"/>
                 </a:solidFill>
               </a:rPr>
-              <a:t>– like this pin joint – are (possibly time-varying) constraint functions, </a:t>
+              <a:t>– like pin joints – are (possibly time-varying) constraint functions, </a:t>
             </a:r>
             <a:r>
               <a:rPr lang="en-US" i="1" dirty="0">
@@ -2242,7 +2242,7 @@
                   <a:srgbClr val="000000"/>
                 </a:solidFill>
               </a:rPr>
-              <a:t>(i.e., the set of all configurations that satisfy these constraints. </a:t>
+              <a:t>(i.e., the set of all configurations that satisfy these constraints). </a:t>
             </a:r>
           </a:p>
         </p:txBody>
@@ -2351,8 +2351,8 @@
           </a:prstGeom>
         </p:spPr>
       </p:pic>
-      <mc:AlternateContent xmlns:mc="http://schemas.openxmlformats.org/markup-compatibility/2006">
-        <mc:Choice xmlns:a14="http://schemas.microsoft.com/office/drawing/2010/main" Requires="a14">
+      <mc:AlternateContent xmlns:mc="http://schemas.openxmlformats.org/markup-compatibility/2006" xmlns:a14="http://schemas.microsoft.com/office/drawing/2010/main">
+        <mc:Choice Requires="a14">
           <p:sp>
             <p:nvSpPr>
               <p:cNvPr id="22" name="Rectangle 21"/>
@@ -2379,6 +2379,7 @@
               </a:bodyPr>
               <a:lstStyle/>
               <a:p>
+                <a:pPr/>
                 <a14:m>
                   <m:oMathPara xmlns:m="http://schemas.openxmlformats.org/officeDocument/2006/math">
                     <m:oMathParaPr>
@@ -2562,7 +2563,7 @@
             </p:txBody>
           </p:sp>
         </mc:Choice>
-        <mc:Fallback>
+        <mc:Fallback xmlns="">
           <p:sp>
             <p:nvSpPr>
               <p:cNvPr id="22" name="Rectangle 21"/>
@@ -2720,7 +2721,7 @@
                   <a:srgbClr val="000000"/>
                 </a:solidFill>
               </a:rPr>
-              <a:t>of the rigid bodies – Inertial and collision effects cannot be ignored!</a:t>
+              <a:t>of the rigid bodies – inertial and collision effects cannot be ignored!</a:t>
             </a:r>
           </a:p>
         </p:txBody>
@@ -3015,8 +3016,8 @@
           </a:p>
         </p:txBody>
       </p:sp>
-      <mc:AlternateContent xmlns:mc="http://schemas.openxmlformats.org/markup-compatibility/2006">
-        <mc:Choice xmlns:a14="http://schemas.microsoft.com/office/drawing/2010/main" Requires="a14">
+      <mc:AlternateContent xmlns:mc="http://schemas.openxmlformats.org/markup-compatibility/2006" xmlns:a14="http://schemas.microsoft.com/office/drawing/2010/main">
+        <mc:Choice Requires="a14">
           <p:sp>
             <p:nvSpPr>
               <p:cNvPr id="8" name="TextBox 7"/>
@@ -3121,7 +3122,7 @@
             </p:txBody>
           </p:sp>
         </mc:Choice>
-        <mc:Fallback>
+        <mc:Fallback xmlns="">
           <p:sp>
             <p:nvSpPr>
               <p:cNvPr id="8" name="TextBox 7"/>
@@ -3168,8 +3169,8 @@
         </p:nvSpPr>
         <p:spPr>
           <a:xfrm>
-            <a:off x="5062398" y="3255930"/>
-            <a:ext cx="6888479" cy="1754326"/>
+            <a:off x="5062398" y="3166408"/>
+            <a:ext cx="6888479" cy="1938992"/>
           </a:xfrm>
           <a:prstGeom prst="rect">
             <a:avLst/>
@@ -3202,12 +3203,22 @@
             <a:r>
               <a:rPr lang="en-US" dirty="0">
                 <a:solidFill>
+                  <a:srgbClr val="000000"/>
+                </a:solidFill>
+                <a:latin typeface="+mj-lt"/>
+                <a:cs typeface="Times New Roman" panose="02020603050405020304" pitchFamily="18" charset="0"/>
+              </a:rPr>
+              <a:t>The </a:t>
+            </a:r>
+            <a:r>
+              <a:rPr lang="en-US" dirty="0">
+                <a:solidFill>
                   <a:srgbClr val="C00000"/>
                 </a:solidFill>
                 <a:latin typeface="+mj-lt"/>
                 <a:cs typeface="Times New Roman" panose="02020603050405020304" pitchFamily="18" charset="0"/>
               </a:rPr>
-              <a:t>The distal and proximal end</a:t>
+              <a:t>distal and proximal ends </a:t>
             </a:r>
             <a:r>
               <a:rPr lang="en-US" dirty="0">
@@ -3217,7 +3228,7 @@
                 <a:latin typeface="+mj-lt"/>
                 <a:cs typeface="Times New Roman" panose="02020603050405020304" pitchFamily="18" charset="0"/>
               </a:rPr>
-              <a:t> of any link will </a:t>
+              <a:t>of any link will </a:t>
             </a:r>
             <a:r>
               <a:rPr lang="en-US" dirty="0">
@@ -3263,7 +3274,7 @@
                 <a:latin typeface="+mj-lt"/>
                 <a:cs typeface="Times New Roman" panose="02020603050405020304" pitchFamily="18" charset="0"/>
               </a:rPr>
-              <a:t>joint constrains the position </a:t>
+              <a:t>joint constrains the position at the joint </a:t>
             </a:r>
             <a:r>
               <a:rPr lang="en-US" dirty="0">
@@ -3273,7 +3284,20 @@
                 <a:latin typeface="+mj-lt"/>
                 <a:cs typeface="Times New Roman" panose="02020603050405020304" pitchFamily="18" charset="0"/>
               </a:rPr>
-              <a:t>of the proximal end of one segment with the distal end of the previous segment.</a:t>
+              <a:t>for the proximal end of one segment and the distal end of the previous segment.</a:t>
+            </a:r>
+          </a:p>
+          <a:p>
+            <a:pPr algn="just"/>
+            <a:r>
+              <a:rPr lang="en-US" sz="800" dirty="0">
+                <a:solidFill>
+                  <a:srgbClr val="000000"/>
+                </a:solidFill>
+                <a:latin typeface="+mj-lt"/>
+                <a:cs typeface="Times New Roman" panose="02020603050405020304" pitchFamily="18" charset="0"/>
+              </a:rPr>
+              <a:t> </a:t>
             </a:r>
           </a:p>
           <a:p>
@@ -3291,8 +3315,8 @@
           </a:p>
         </p:txBody>
       </p:sp>
-      <mc:AlternateContent xmlns:mc="http://schemas.openxmlformats.org/markup-compatibility/2006">
-        <mc:Choice xmlns:a14="http://schemas.microsoft.com/office/drawing/2010/main" Requires="a14">
+      <mc:AlternateContent xmlns:mc="http://schemas.openxmlformats.org/markup-compatibility/2006" xmlns:a14="http://schemas.microsoft.com/office/drawing/2010/main">
+        <mc:Choice Requires="a14">
           <p:sp>
             <p:nvSpPr>
               <p:cNvPr id="12" name="TextBox 11"/>
@@ -3407,6 +3431,7 @@
                 </a:endParaRPr>
               </a:p>
               <a:p>
+                <a:pPr/>
                 <a14:m>
                   <m:oMathPara xmlns:m="http://schemas.openxmlformats.org/officeDocument/2006/math">
                     <m:oMathParaPr>
@@ -3885,7 +3910,7 @@
             </p:txBody>
           </p:sp>
         </mc:Choice>
-        <mc:Fallback>
+        <mc:Fallback xmlns="">
           <p:sp>
             <p:nvSpPr>
               <p:cNvPr id="12" name="TextBox 11"/>
@@ -3924,8 +3949,8 @@
           </p:sp>
         </mc:Fallback>
       </mc:AlternateContent>
-      <mc:AlternateContent xmlns:mc="http://schemas.openxmlformats.org/markup-compatibility/2006">
-        <mc:Choice xmlns:a14="http://schemas.microsoft.com/office/drawing/2010/main" Requires="a14">
+      <mc:AlternateContent xmlns:mc="http://schemas.openxmlformats.org/markup-compatibility/2006" xmlns:a14="http://schemas.microsoft.com/office/drawing/2010/main">
+        <mc:Choice Requires="a14">
           <p:sp>
             <p:nvSpPr>
               <p:cNvPr id="15" name="TextBox 14"/>
@@ -4118,7 +4143,7 @@
             </p:txBody>
           </p:sp>
         </mc:Choice>
-        <mc:Fallback>
+        <mc:Fallback xmlns="">
           <p:sp>
             <p:nvSpPr>
               <p:cNvPr id="15" name="TextBox 14"/>
@@ -4159,7 +4184,7 @@
       </mc:AlternateContent>
       <p:pic>
         <p:nvPicPr>
-          <p:cNvPr id="18" name="Graphic 17"/>
+          <p:cNvPr id="13" name="Graphic 12"/>
           <p:cNvPicPr>
             <a:picLocks noChangeAspect="1"/>
           </p:cNvPicPr>
@@ -4179,8 +4204,8 @@
         </p:blipFill>
         <p:spPr>
           <a:xfrm>
-            <a:off x="396830" y="3251168"/>
-            <a:ext cx="4175170" cy="2543696"/>
+            <a:off x="378656" y="3170033"/>
+            <a:ext cx="4269544" cy="2601193"/>
           </a:xfrm>
           <a:prstGeom prst="rect">
             <a:avLst/>
@@ -4282,8 +4307,8 @@
           </a:fontRef>
         </p:style>
       </p:cxnSp>
-      <mc:AlternateContent xmlns:mc="http://schemas.openxmlformats.org/markup-compatibility/2006">
-        <mc:Choice xmlns:a14="http://schemas.microsoft.com/office/drawing/2010/main" Requires="a14">
+      <mc:AlternateContent xmlns:mc="http://schemas.openxmlformats.org/markup-compatibility/2006" xmlns:a14="http://schemas.microsoft.com/office/drawing/2010/main">
+        <mc:Choice Requires="a14">
           <p:sp>
             <p:nvSpPr>
               <p:cNvPr id="7" name="TextBox 6"/>
@@ -4948,7 +4973,7 @@
             </p:txBody>
           </p:sp>
         </mc:Choice>
-        <mc:Fallback>
+        <mc:Fallback xmlns="">
           <p:sp>
             <p:nvSpPr>
               <p:cNvPr id="7" name="TextBox 6"/>
@@ -5166,8 +5191,8 @@
             </p:nvSpPr>
             <p:spPr>
               <a:xfrm>
-                <a:off x="4118329" y="3489067"/>
-                <a:ext cx="3750322" cy="1954638"/>
+                <a:off x="4118329" y="3511092"/>
+                <a:ext cx="3747949" cy="1910588"/>
               </a:xfrm>
               <a:prstGeom prst="rect">
                 <a:avLst/>
@@ -5266,7 +5291,7 @@
                       <m:sSub>
                         <m:sSubPr>
                           <m:ctrlPr>
-                            <a:rPr lang="en-US" b="1" u="sng" smtClean="0">
+                            <a:rPr lang="en-US" b="1" i="1" u="sng" smtClean="0">
                               <a:solidFill>
                                 <a:srgbClr val="000000"/>
                               </a:solidFill>
@@ -5307,7 +5332,6 @@
                 </a:endParaRPr>
               </a:p>
               <a:p>
-                <a:pPr/>
                 <a:endParaRPr lang="en-US" sz="1050" b="1" u="sng" dirty="0">
                   <a:solidFill>
                     <a:srgbClr val="000000"/>
@@ -5755,31 +5779,15 @@
                               </m:r>
                             </m:e>
                             <m:sub>
-                              <m:eqArr>
-                                <m:eqArrPr>
-                                  <m:ctrlPr>
-                                    <a:rPr lang="en-US" b="1" i="1" smtClean="0">
-                                      <a:solidFill>
-                                        <a:srgbClr val="C00000"/>
-                                      </a:solidFill>
-                                      <a:latin typeface="Cambria Math" panose="02040503050406030204" pitchFamily="18" charset="0"/>
-                                    </a:rPr>
-                                  </m:ctrlPr>
-                                </m:eqArrPr>
-                                <m:e>
-                                  <m:r>
-                                    <a:rPr lang="en-US" b="1" i="1" smtClean="0">
-                                      <a:solidFill>
-                                        <a:srgbClr val="C00000"/>
-                                      </a:solidFill>
-                                      <a:latin typeface="Cambria Math" panose="02040503050406030204" pitchFamily="18" charset="0"/>
-                                    </a:rPr>
-                                    <m:t>𝟐</m:t>
-                                  </m:r>
-                                </m:e>
-                                <m:e/>
-                                <m:e/>
-                              </m:eqArr>
+                              <m:r>
+                                <a:rPr lang="en-US" b="1" i="1" smtClean="0">
+                                  <a:solidFill>
+                                    <a:srgbClr val="C00000"/>
+                                  </a:solidFill>
+                                  <a:latin typeface="Cambria Math" panose="02040503050406030204" pitchFamily="18" charset="0"/>
+                                </a:rPr>
+                                <m:t>𝟐</m:t>
+                              </m:r>
                             </m:sub>
                           </m:sSub>
                         </m:sub>
@@ -5787,6 +5795,14 @@
                     </m:oMath>
                   </m:oMathPara>
                 </a14:m>
+                <a:endParaRPr lang="en-US" b="1" i="1" dirty="0">
+                  <a:solidFill>
+                    <a:srgbClr val="C00000"/>
+                  </a:solidFill>
+                </a:endParaRPr>
+              </a:p>
+              <a:p>
+                <a:pPr algn="ctr"/>
                 <a:endParaRPr lang="en-US" b="1" i="1" dirty="0">
                   <a:solidFill>
                     <a:srgbClr val="C00000"/>
@@ -5805,6 +5821,9 @@
                         <m:sSubPr>
                           <m:ctrlPr>
                             <a:rPr lang="en-US" b="1" i="1" smtClean="0">
+                              <a:solidFill>
+                                <a:srgbClr val="C00000"/>
+                              </a:solidFill>
                               <a:latin typeface="Cambria Math" panose="02040503050406030204" pitchFamily="18" charset="0"/>
                             </a:rPr>
                           </m:ctrlPr>
@@ -5812,6 +5831,9 @@
                         <m:e>
                           <m:r>
                             <a:rPr lang="en-US" b="1" i="1" smtClean="0">
+                              <a:solidFill>
+                                <a:srgbClr val="C00000"/>
+                              </a:solidFill>
                               <a:latin typeface="Cambria Math" panose="02040503050406030204" pitchFamily="18" charset="0"/>
                             </a:rPr>
                             <m:t>𝒉</m:t>
@@ -5820,6 +5842,9 @@
                         <m:sub>
                           <m:r>
                             <a:rPr lang="en-US" b="1" i="1" smtClean="0">
+                              <a:solidFill>
+                                <a:srgbClr val="C00000"/>
+                              </a:solidFill>
                               <a:latin typeface="Cambria Math" panose="02040503050406030204" pitchFamily="18" charset="0"/>
                             </a:rPr>
                             <m:t>𝟐</m:t>
@@ -5828,6 +5853,9 @@
                       </m:sSub>
                       <m:r>
                         <a:rPr lang="en-US" b="1" i="1" smtClean="0">
+                          <a:solidFill>
+                            <a:srgbClr val="C00000"/>
+                          </a:solidFill>
                           <a:latin typeface="Cambria Math" panose="02040503050406030204" pitchFamily="18" charset="0"/>
                         </a:rPr>
                         <m:t>= </m:t>
@@ -5836,6 +5864,9 @@
                         <m:dPr>
                           <m:ctrlPr>
                             <a:rPr lang="en-US" b="1" i="1" smtClean="0">
+                              <a:solidFill>
+                                <a:srgbClr val="C00000"/>
+                              </a:solidFill>
                               <a:latin typeface="Cambria Math" panose="02040503050406030204" pitchFamily="18" charset="0"/>
                             </a:rPr>
                           </m:ctrlPr>
@@ -6398,7 +6429,11 @@
                     </m:oMath>
                   </m:oMathPara>
                 </a14:m>
-                <a:endParaRPr lang="en-US" b="1" i="1" dirty="0"/>
+                <a:endParaRPr lang="en-US" b="1" i="1" dirty="0">
+                  <a:solidFill>
+                    <a:srgbClr val="C00000"/>
+                  </a:solidFill>
+                </a:endParaRPr>
               </a:p>
             </p:txBody>
           </p:sp>
@@ -6414,8 +6449,8 @@
             </p:nvSpPr>
             <p:spPr>
               <a:xfrm>
-                <a:off x="4118329" y="3489067"/>
-                <a:ext cx="3750322" cy="1954638"/>
+                <a:off x="4118329" y="3511092"/>
+                <a:ext cx="3747949" cy="1910588"/>
               </a:xfrm>
               <a:prstGeom prst="rect">
                 <a:avLst/>
@@ -6423,7 +6458,7 @@
               <a:blipFill>
                 <a:blip r:embed="rId3"/>
                 <a:stretch>
-                  <a:fillRect l="-163"/>
+                  <a:fillRect/>
                 </a:stretch>
               </a:blipFill>
             </p:spPr>
@@ -7112,7 +7147,6 @@
                 <a:endParaRPr lang="en-US" sz="1600" dirty="0"/>
               </a:p>
               <a:p>
-                <a:pPr/>
                 <a:r>
                   <a:rPr lang="en-US" sz="400" dirty="0"/>
                   <a:t> </a:t>
@@ -7653,38 +7687,8 @@
           </p:sp>
         </mc:Fallback>
       </mc:AlternateContent>
-      <p:pic>
-        <p:nvPicPr>
-          <p:cNvPr id="6" name="Graphic 5"/>
-          <p:cNvPicPr>
-            <a:picLocks noChangeAspect="1"/>
-          </p:cNvPicPr>
-          <p:nvPr/>
-        </p:nvPicPr>
-        <p:blipFill>
-          <a:blip r:embed="rId5">
-            <a:extLst>
-              <a:ext uri="{96DAC541-7B7A-43D3-8B79-37D633B846F1}">
-                <asvg:svgBlip xmlns:asvg="http://schemas.microsoft.com/office/drawing/2016/SVG/main" r:embed="rId6"/>
-              </a:ext>
-            </a:extLst>
-          </a:blip>
-          <a:stretch>
-            <a:fillRect/>
-          </a:stretch>
-        </p:blipFill>
-        <p:spPr>
-          <a:xfrm>
-            <a:off x="4000499" y="965557"/>
-            <a:ext cx="3947617" cy="2405061"/>
-          </a:xfrm>
-          <a:prstGeom prst="rect">
-            <a:avLst/>
-          </a:prstGeom>
-        </p:spPr>
-      </p:pic>
-      <mc:AlternateContent xmlns:mc="http://schemas.openxmlformats.org/markup-compatibility/2006">
-        <mc:Choice xmlns:a14="http://schemas.microsoft.com/office/drawing/2010/main" Requires="a14">
+      <mc:AlternateContent xmlns:mc="http://schemas.openxmlformats.org/markup-compatibility/2006" xmlns:a14="http://schemas.microsoft.com/office/drawing/2010/main">
+        <mc:Choice Requires="a14">
           <p:sp>
             <p:nvSpPr>
               <p:cNvPr id="21" name="TextBox 20"/>
@@ -9477,7 +9481,7 @@
             </p:txBody>
           </p:sp>
         </mc:Choice>
-        <mc:Fallback>
+        <mc:Fallback xmlns="">
           <p:sp>
             <p:nvSpPr>
               <p:cNvPr id="21" name="TextBox 20"/>
@@ -9516,8 +9520,8 @@
           </p:sp>
         </mc:Fallback>
       </mc:AlternateContent>
-      <mc:AlternateContent xmlns:mc="http://schemas.openxmlformats.org/markup-compatibility/2006">
-        <mc:Choice xmlns:a14="http://schemas.microsoft.com/office/drawing/2010/main" Requires="a14">
+      <mc:AlternateContent xmlns:mc="http://schemas.openxmlformats.org/markup-compatibility/2006" xmlns:a14="http://schemas.microsoft.com/office/drawing/2010/main">
+        <mc:Choice Requires="a14">
           <p:sp>
             <p:nvSpPr>
               <p:cNvPr id="23" name="TextBox 22"/>
@@ -9703,7 +9707,6 @@
                 </a:endParaRPr>
               </a:p>
               <a:p>
-                <a:pPr/>
                 <a:r>
                   <a:rPr lang="en-US" sz="600" i="1" dirty="0">
                     <a:solidFill>
@@ -10515,13 +10518,7 @@
                               <a:rPr lang="en-US" sz="1200" i="1">
                                 <a:latin typeface="Cambria Math" panose="02040503050406030204" pitchFamily="18" charset="0"/>
                               </a:rPr>
-                              <m:t>0</m:t>
-                            </m:r>
-                            <m:r>
-                              <a:rPr lang="en-US" sz="1200" i="1">
-                                <a:latin typeface="Cambria Math" panose="02040503050406030204" pitchFamily="18" charset="0"/>
-                              </a:rPr>
-                              <m:t>  </m:t>
+                              <m:t>0  </m:t>
                             </m:r>
                           </m:e>
                         </m:eqArr>
@@ -10554,13 +10551,7 @@
                               <a:rPr lang="en-US" sz="1200" i="1">
                                 <a:latin typeface="Cambria Math" panose="02040503050406030204" pitchFamily="18" charset="0"/>
                               </a:rPr>
-                              <m:t>0</m:t>
-                            </m:r>
-                            <m:r>
-                              <a:rPr lang="en-US" sz="1200" i="1">
-                                <a:latin typeface="Cambria Math" panose="02040503050406030204" pitchFamily="18" charset="0"/>
-                              </a:rPr>
-                              <m:t>  </m:t>
+                              <m:t>0  </m:t>
                             </m:r>
                           </m:e>
                         </m:eqArr>
@@ -10623,7 +10614,6 @@
                 <a:endParaRPr lang="en-US" sz="1200" dirty="0"/>
               </a:p>
               <a:p>
-                <a:pPr/>
                 <a:r>
                   <a:rPr lang="en-US" sz="1600" dirty="0">
                     <a:solidFill>
@@ -11664,7 +11654,7 @@
             </p:txBody>
           </p:sp>
         </mc:Choice>
-        <mc:Fallback>
+        <mc:Fallback xmlns="">
           <p:sp>
             <p:nvSpPr>
               <p:cNvPr id="23" name="TextBox 22"/>
@@ -11703,6 +11693,36 @@
           </p:sp>
         </mc:Fallback>
       </mc:AlternateContent>
+      <p:pic>
+        <p:nvPicPr>
+          <p:cNvPr id="14" name="Graphic 13"/>
+          <p:cNvPicPr>
+            <a:picLocks noChangeAspect="1"/>
+          </p:cNvPicPr>
+          <p:nvPr/>
+        </p:nvPicPr>
+        <p:blipFill>
+          <a:blip r:embed="rId9">
+            <a:extLst>
+              <a:ext uri="{96DAC541-7B7A-43D3-8B79-37D633B846F1}">
+                <asvg:svgBlip xmlns:asvg="http://schemas.microsoft.com/office/drawing/2016/SVG/main" r:embed="rId10"/>
+              </a:ext>
+            </a:extLst>
+          </a:blip>
+          <a:stretch>
+            <a:fillRect/>
+          </a:stretch>
+        </p:blipFill>
+        <p:spPr>
+          <a:xfrm>
+            <a:off x="3997787" y="943572"/>
+            <a:ext cx="3983702" cy="2427046"/>
+          </a:xfrm>
+          <a:prstGeom prst="rect">
+            <a:avLst/>
+          </a:prstGeom>
+        </p:spPr>
+      </p:pic>
     </p:spTree>
     <p:extLst>
       <p:ext uri="{BB962C8B-B14F-4D97-AF65-F5344CB8AC3E}">
@@ -11838,7 +11858,7 @@
                 <a:ea typeface="Cambria Math" charset="0"/>
                 <a:cs typeface="Cambria Math" charset="0"/>
               </a:rPr>
-              <a:t>provides a way to understand the interaction of configuration spaces that produce endpoint configurations in articulated systems – with </a:t>
+              <a:t>provides a way to understand the interaction between configuration spaces that produce endpoint configurations in articulated systems – with </a:t>
             </a:r>
             <a:r>
               <a:rPr lang="en-US" dirty="0">

</xml_diff>